<commit_message>
update from class notes lesson 2
</commit_message>
<xml_diff>
--- a/resources/hw/genomic-data-visualization-HW_1.pptx
+++ b/resources/hw/genomic-data-visualization-HW_1.pptx
@@ -276,7 +276,7 @@
           <a:p>
             <a:fld id="{3B49BF8B-8FD1-1748-B518-B651293E6FA0}" type="datetimeFigureOut">
               <a:rPr lang="en-US" smtClean="0"/>
-              <a:t>1/21/23</a:t>
+              <a:t>1/27/23</a:t>
             </a:fld>
             <a:endParaRPr lang="en-US"/>
           </a:p>
@@ -446,7 +446,7 @@
           <a:p>
             <a:fld id="{3B49BF8B-8FD1-1748-B518-B651293E6FA0}" type="datetimeFigureOut">
               <a:rPr lang="en-US" smtClean="0"/>
-              <a:t>1/21/23</a:t>
+              <a:t>1/27/23</a:t>
             </a:fld>
             <a:endParaRPr lang="en-US"/>
           </a:p>
@@ -626,7 +626,7 @@
           <a:p>
             <a:fld id="{3B49BF8B-8FD1-1748-B518-B651293E6FA0}" type="datetimeFigureOut">
               <a:rPr lang="en-US" smtClean="0"/>
-              <a:t>1/21/23</a:t>
+              <a:t>1/27/23</a:t>
             </a:fld>
             <a:endParaRPr lang="en-US"/>
           </a:p>
@@ -796,7 +796,7 @@
           <a:p>
             <a:fld id="{3B49BF8B-8FD1-1748-B518-B651293E6FA0}" type="datetimeFigureOut">
               <a:rPr lang="en-US" smtClean="0"/>
-              <a:t>1/21/23</a:t>
+              <a:t>1/27/23</a:t>
             </a:fld>
             <a:endParaRPr lang="en-US"/>
           </a:p>
@@ -1056,7 +1056,7 @@
           <a:p>
             <a:fld id="{3B49BF8B-8FD1-1748-B518-B651293E6FA0}" type="datetimeFigureOut">
               <a:rPr lang="en-US" smtClean="0"/>
-              <a:t>1/21/23</a:t>
+              <a:t>1/27/23</a:t>
             </a:fld>
             <a:endParaRPr lang="en-US"/>
           </a:p>
@@ -1288,7 +1288,7 @@
           <a:p>
             <a:fld id="{3B49BF8B-8FD1-1748-B518-B651293E6FA0}" type="datetimeFigureOut">
               <a:rPr lang="en-US" smtClean="0"/>
-              <a:t>1/21/23</a:t>
+              <a:t>1/27/23</a:t>
             </a:fld>
             <a:endParaRPr lang="en-US"/>
           </a:p>
@@ -1643,7 +1643,7 @@
           <a:p>
             <a:fld id="{3B49BF8B-8FD1-1748-B518-B651293E6FA0}" type="datetimeFigureOut">
               <a:rPr lang="en-US" smtClean="0"/>
-              <a:t>1/21/23</a:t>
+              <a:t>1/27/23</a:t>
             </a:fld>
             <a:endParaRPr lang="en-US"/>
           </a:p>
@@ -1784,7 +1784,7 @@
           <a:p>
             <a:fld id="{3B49BF8B-8FD1-1748-B518-B651293E6FA0}" type="datetimeFigureOut">
               <a:rPr lang="en-US" smtClean="0"/>
-              <a:t>1/21/23</a:t>
+              <a:t>1/27/23</a:t>
             </a:fld>
             <a:endParaRPr lang="en-US"/>
           </a:p>
@@ -1879,7 +1879,7 @@
           <a:p>
             <a:fld id="{3B49BF8B-8FD1-1748-B518-B651293E6FA0}" type="datetimeFigureOut">
               <a:rPr lang="en-US" smtClean="0"/>
-              <a:t>1/21/23</a:t>
+              <a:t>1/27/23</a:t>
             </a:fld>
             <a:endParaRPr lang="en-US"/>
           </a:p>
@@ -2236,7 +2236,7 @@
           <a:p>
             <a:fld id="{3B49BF8B-8FD1-1748-B518-B651293E6FA0}" type="datetimeFigureOut">
               <a:rPr lang="en-US" smtClean="0"/>
-              <a:t>1/21/23</a:t>
+              <a:t>1/27/23</a:t>
             </a:fld>
             <a:endParaRPr lang="en-US"/>
           </a:p>
@@ -2554,7 +2554,7 @@
           <a:p>
             <a:fld id="{3B49BF8B-8FD1-1748-B518-B651293E6FA0}" type="datetimeFigureOut">
               <a:rPr lang="en-US" smtClean="0"/>
-              <a:t>1/21/23</a:t>
+              <a:t>1/27/23</a:t>
             </a:fld>
             <a:endParaRPr lang="en-US"/>
           </a:p>
@@ -2799,7 +2799,7 @@
           <a:p>
             <a:fld id="{3B49BF8B-8FD1-1748-B518-B651293E6FA0}" type="datetimeFigureOut">
               <a:rPr lang="en-US" smtClean="0"/>
-              <a:t>1/21/23</a:t>
+              <a:t>1/27/23</a:t>
             </a:fld>
             <a:endParaRPr lang="en-US"/>
           </a:p>
@@ -3724,7 +3724,7 @@
         </p:spPr>
         <p:txBody>
           <a:bodyPr>
-            <a:normAutofit fontScale="92500" lnSpcReduction="10000"/>
+            <a:normAutofit fontScale="92500"/>
           </a:bodyPr>
           <a:lstStyle/>
           <a:p>
@@ -3791,7 +3791,7 @@
                   <a:srgbClr val="404040"/>
                 </a:solidFill>
               </a:rPr>
-              <a:t>What type of data visualization is this? What about the data are you trying to make salient through this data visualization? </a:t>
+              <a:t>What about the data are you trying to make salient through this data visualization? </a:t>
             </a:r>
           </a:p>
           <a:p>
@@ -4226,7 +4226,7 @@
                 <a:effectLst/>
                 <a:latin typeface="-apple-system"/>
               </a:rPr>
-              <a:t>What type of data visualization is this? What about the data are you trying to make salient through this data visualization?</a:t>
+              <a:t>What about the data are you trying to make salient through this data visualization?</a:t>
             </a:r>
           </a:p>
           <a:p>
@@ -4238,7 +4238,7 @@
                 <a:effectLst/>
                 <a:latin typeface="Merriweather" pitchFamily="2" charset="77"/>
               </a:rPr>
-              <a:t>My explanatory data visualization seeks to make more salient the relationship between ERBB2 expression and the cell area.</a:t>
+              <a:t>My data visualization seeks to make more salient the relationship between ERBB2 expression and the cell area.</a:t>
             </a:r>
           </a:p>
           <a:p>

</xml_diff>